<commit_message>
first power bi project
</commit_message>
<xml_diff>
--- a/Credit Card Weekly Analysis.pptx
+++ b/Credit Card Weekly Analysis.pptx
@@ -5920,6 +5920,54 @@
           </a:p>
         </p:txBody>
       </p:sp>
+      <p:sp>
+        <p:nvSpPr>
+          <p:cNvPr id="4" name="TextBox 3">
+            <a:extLst>
+              <a:ext uri="{FF2B5EF4-FFF2-40B4-BE49-F238E27FC236}">
+                <a16:creationId xmlns:a16="http://schemas.microsoft.com/office/drawing/2014/main" id="{DD9446DF-B81B-E8AC-DA86-24191F2C02FF}"/>
+              </a:ext>
+            </a:extLst>
+          </p:cNvPr>
+          <p:cNvSpPr txBox="1"/>
+          <p:nvPr/>
+        </p:nvSpPr>
+        <p:spPr>
+          <a:xfrm>
+            <a:off x="8724900" y="4845089"/>
+            <a:ext cx="327660" cy="246221"/>
+          </a:xfrm>
+          <a:prstGeom prst="rect">
+            <a:avLst/>
+          </a:prstGeom>
+          <a:noFill/>
+        </p:spPr>
+        <p:txBody>
+          <a:bodyPr wrap="square" rtlCol="0">
+            <a:spAutoFit/>
+          </a:bodyPr>
+          <a:lstStyle/>
+          <a:p>
+            <a:r>
+              <a:rPr lang="en-US" sz="1000" b="1">
+                <a:solidFill>
+                  <a:schemeClr val="bg1"/>
+                </a:solidFill>
+                <a:latin typeface="Poppins" panose="00000500000000000000" pitchFamily="2" charset="0"/>
+                <a:cs typeface="Poppins" panose="00000500000000000000" pitchFamily="2" charset="0"/>
+              </a:rPr>
+              <a:t>9</a:t>
+            </a:r>
+            <a:endParaRPr lang="en-IN" sz="1000" b="1">
+              <a:solidFill>
+                <a:schemeClr val="bg1"/>
+              </a:solidFill>
+              <a:latin typeface="Poppins" panose="00000500000000000000" pitchFamily="2" charset="0"/>
+              <a:cs typeface="Poppins" panose="00000500000000000000" pitchFamily="2" charset="0"/>
+            </a:endParaRPr>
+          </a:p>
+        </p:txBody>
+      </p:sp>
     </p:spTree>
     <p:extLst>
       <p:ext uri="{BB962C8B-B14F-4D97-AF65-F5344CB8AC3E}">
@@ -6611,6 +6659,54 @@
               </a:rPr>
               <a:t>Highest Revenue is generated from Texas, New York and California.</a:t>
             </a:r>
+          </a:p>
+        </p:txBody>
+      </p:sp>
+      <p:sp>
+        <p:nvSpPr>
+          <p:cNvPr id="4" name="TextBox 3">
+            <a:extLst>
+              <a:ext uri="{FF2B5EF4-FFF2-40B4-BE49-F238E27FC236}">
+                <a16:creationId xmlns:a16="http://schemas.microsoft.com/office/drawing/2014/main" id="{97A4EF50-0A43-A2E8-BA90-E349C6701FF7}"/>
+              </a:ext>
+            </a:extLst>
+          </p:cNvPr>
+          <p:cNvSpPr txBox="1"/>
+          <p:nvPr/>
+        </p:nvSpPr>
+        <p:spPr>
+          <a:xfrm>
+            <a:off x="8724900" y="4845089"/>
+            <a:ext cx="327660" cy="246221"/>
+          </a:xfrm>
+          <a:prstGeom prst="rect">
+            <a:avLst/>
+          </a:prstGeom>
+          <a:noFill/>
+        </p:spPr>
+        <p:txBody>
+          <a:bodyPr wrap="square" rtlCol="0">
+            <a:spAutoFit/>
+          </a:bodyPr>
+          <a:lstStyle/>
+          <a:p>
+            <a:r>
+              <a:rPr lang="en-US" sz="1000" b="1">
+                <a:solidFill>
+                  <a:schemeClr val="bg1"/>
+                </a:solidFill>
+                <a:latin typeface="Poppins" panose="00000500000000000000" pitchFamily="2" charset="0"/>
+                <a:cs typeface="Poppins" panose="00000500000000000000" pitchFamily="2" charset="0"/>
+              </a:rPr>
+              <a:t>10</a:t>
+            </a:r>
+            <a:endParaRPr lang="en-IN" sz="1000" b="1">
+              <a:solidFill>
+                <a:schemeClr val="bg1"/>
+              </a:solidFill>
+              <a:latin typeface="Poppins" panose="00000500000000000000" pitchFamily="2" charset="0"/>
+              <a:cs typeface="Poppins" panose="00000500000000000000" pitchFamily="2" charset="0"/>
+            </a:endParaRPr>
           </a:p>
         </p:txBody>
       </p:sp>
@@ -9914,11 +10010,71 @@
           </a:p>
         </p:txBody>
       </p:sp>
+      <p:sp>
+        <p:nvSpPr>
+          <p:cNvPr id="2" name="TextBox 1">
+            <a:extLst>
+              <a:ext uri="{FF2B5EF4-FFF2-40B4-BE49-F238E27FC236}">
+                <a16:creationId xmlns:a16="http://schemas.microsoft.com/office/drawing/2014/main" id="{B23A27A5-422A-B8A2-5CEB-DB8FAE2C71EB}"/>
+              </a:ext>
+            </a:extLst>
+          </p:cNvPr>
+          <p:cNvSpPr txBox="1"/>
+          <p:nvPr/>
+        </p:nvSpPr>
+        <p:spPr>
+          <a:xfrm>
+            <a:off x="8724900" y="4845089"/>
+            <a:ext cx="327660" cy="246221"/>
+          </a:xfrm>
+          <a:prstGeom prst="rect">
+            <a:avLst/>
+          </a:prstGeom>
+          <a:noFill/>
+        </p:spPr>
+        <p:txBody>
+          <a:bodyPr wrap="square" rtlCol="0">
+            <a:spAutoFit/>
+          </a:bodyPr>
+          <a:lstStyle/>
+          <a:p>
+            <a:r>
+              <a:rPr lang="en-US" sz="1000" b="1">
+                <a:solidFill>
+                  <a:schemeClr val="bg1"/>
+                </a:solidFill>
+                <a:latin typeface="Poppins" panose="00000500000000000000" pitchFamily="2" charset="0"/>
+                <a:cs typeface="Poppins" panose="00000500000000000000" pitchFamily="2" charset="0"/>
+              </a:rPr>
+              <a:t>1</a:t>
+            </a:r>
+            <a:endParaRPr lang="en-IN" sz="1000" b="1">
+              <a:solidFill>
+                <a:schemeClr val="bg1"/>
+              </a:solidFill>
+              <a:latin typeface="Poppins" panose="00000500000000000000" pitchFamily="2" charset="0"/>
+              <a:cs typeface="Poppins" panose="00000500000000000000" pitchFamily="2" charset="0"/>
+            </a:endParaRPr>
+          </a:p>
+        </p:txBody>
+      </p:sp>
     </p:spTree>
   </p:cSld>
   <p:clrMapOvr>
     <a:masterClrMapping/>
   </p:clrMapOvr>
+  <mc:AlternateContent xmlns:mc="http://schemas.openxmlformats.org/markup-compatibility/2006">
+    <mc:Choice xmlns:p15="http://schemas.microsoft.com/office/powerpoint/2012/main" Requires="p15">
+      <p:transition xmlns:p14="http://schemas.microsoft.com/office/powerpoint/2010/main" spd="slow" p14:dur="1250">
+        <p15:prstTrans prst="peelOff"/>
+      </p:transition>
+    </mc:Choice>
+    <mc:Fallback>
+      <p:transition spd="slow">
+        <p:fade/>
+      </p:transition>
+    </mc:Fallback>
+  </mc:AlternateContent>
 </p:sld>
 </file>
 
@@ -10450,6 +10606,54 @@
           </a:p>
         </p:txBody>
       </p:sp>
+      <p:sp>
+        <p:nvSpPr>
+          <p:cNvPr id="3" name="TextBox 2">
+            <a:extLst>
+              <a:ext uri="{FF2B5EF4-FFF2-40B4-BE49-F238E27FC236}">
+                <a16:creationId xmlns:a16="http://schemas.microsoft.com/office/drawing/2014/main" id="{D59F5698-E026-14A2-5A44-C86238764179}"/>
+              </a:ext>
+            </a:extLst>
+          </p:cNvPr>
+          <p:cNvSpPr txBox="1"/>
+          <p:nvPr/>
+        </p:nvSpPr>
+        <p:spPr>
+          <a:xfrm>
+            <a:off x="8724900" y="4845089"/>
+            <a:ext cx="327660" cy="246221"/>
+          </a:xfrm>
+          <a:prstGeom prst="rect">
+            <a:avLst/>
+          </a:prstGeom>
+          <a:noFill/>
+        </p:spPr>
+        <p:txBody>
+          <a:bodyPr wrap="square" rtlCol="0">
+            <a:spAutoFit/>
+          </a:bodyPr>
+          <a:lstStyle/>
+          <a:p>
+            <a:r>
+              <a:rPr lang="en-US" sz="1000" b="1">
+                <a:solidFill>
+                  <a:schemeClr val="bg1"/>
+                </a:solidFill>
+                <a:latin typeface="Poppins" panose="00000500000000000000" pitchFamily="2" charset="0"/>
+                <a:cs typeface="Poppins" panose="00000500000000000000" pitchFamily="2" charset="0"/>
+              </a:rPr>
+              <a:t>2</a:t>
+            </a:r>
+            <a:endParaRPr lang="en-IN" sz="1000" b="1">
+              <a:solidFill>
+                <a:schemeClr val="bg1"/>
+              </a:solidFill>
+              <a:latin typeface="Poppins" panose="00000500000000000000" pitchFamily="2" charset="0"/>
+              <a:cs typeface="Poppins" panose="00000500000000000000" pitchFamily="2" charset="0"/>
+            </a:endParaRPr>
+          </a:p>
+        </p:txBody>
+      </p:sp>
     </p:spTree>
     <p:extLst>
       <p:ext uri="{BB962C8B-B14F-4D97-AF65-F5344CB8AC3E}">
@@ -11115,6 +11319,54 @@
           </a:fontRef>
         </p:style>
       </p:cxnSp>
+      <p:sp>
+        <p:nvSpPr>
+          <p:cNvPr id="3" name="TextBox 2">
+            <a:extLst>
+              <a:ext uri="{FF2B5EF4-FFF2-40B4-BE49-F238E27FC236}">
+                <a16:creationId xmlns:a16="http://schemas.microsoft.com/office/drawing/2014/main" id="{F6502433-D746-21F2-22D0-2FA07E9F973E}"/>
+              </a:ext>
+            </a:extLst>
+          </p:cNvPr>
+          <p:cNvSpPr txBox="1"/>
+          <p:nvPr/>
+        </p:nvSpPr>
+        <p:spPr>
+          <a:xfrm>
+            <a:off x="8724900" y="4845089"/>
+            <a:ext cx="327660" cy="246221"/>
+          </a:xfrm>
+          <a:prstGeom prst="rect">
+            <a:avLst/>
+          </a:prstGeom>
+          <a:noFill/>
+        </p:spPr>
+        <p:txBody>
+          <a:bodyPr wrap="square" rtlCol="0">
+            <a:spAutoFit/>
+          </a:bodyPr>
+          <a:lstStyle/>
+          <a:p>
+            <a:r>
+              <a:rPr lang="en-US" sz="1000" b="1">
+                <a:solidFill>
+                  <a:schemeClr val="bg1"/>
+                </a:solidFill>
+                <a:latin typeface="Poppins" panose="00000500000000000000" pitchFamily="2" charset="0"/>
+                <a:cs typeface="Poppins" panose="00000500000000000000" pitchFamily="2" charset="0"/>
+              </a:rPr>
+              <a:t>3</a:t>
+            </a:r>
+            <a:endParaRPr lang="en-IN" sz="1000" b="1">
+              <a:solidFill>
+                <a:schemeClr val="bg1"/>
+              </a:solidFill>
+              <a:latin typeface="Poppins" panose="00000500000000000000" pitchFamily="2" charset="0"/>
+              <a:cs typeface="Poppins" panose="00000500000000000000" pitchFamily="2" charset="0"/>
+            </a:endParaRPr>
+          </a:p>
+        </p:txBody>
+      </p:sp>
     </p:spTree>
     <p:extLst>
       <p:ext uri="{BB962C8B-B14F-4D97-AF65-F5344CB8AC3E}">
@@ -11810,6 +12062,54 @@
               </a:rPr>
               <a:t>Revenue = 'ccdb cc_detail'[Annual_Fees] + 'ccdb cc_detail'[Total_Trans_Amt] + 'ccdb cc_detail'[Interest_Earned]</a:t>
             </a:r>
+          </a:p>
+        </p:txBody>
+      </p:sp>
+      <p:sp>
+        <p:nvSpPr>
+          <p:cNvPr id="3" name="TextBox 2">
+            <a:extLst>
+              <a:ext uri="{FF2B5EF4-FFF2-40B4-BE49-F238E27FC236}">
+                <a16:creationId xmlns:a16="http://schemas.microsoft.com/office/drawing/2014/main" id="{5FD07D77-4DA6-AD85-5474-8E35A19D02C2}"/>
+              </a:ext>
+            </a:extLst>
+          </p:cNvPr>
+          <p:cNvSpPr txBox="1"/>
+          <p:nvPr/>
+        </p:nvSpPr>
+        <p:spPr>
+          <a:xfrm>
+            <a:off x="8724900" y="4845089"/>
+            <a:ext cx="327660" cy="246221"/>
+          </a:xfrm>
+          <a:prstGeom prst="rect">
+            <a:avLst/>
+          </a:prstGeom>
+          <a:noFill/>
+        </p:spPr>
+        <p:txBody>
+          <a:bodyPr wrap="square" rtlCol="0">
+            <a:spAutoFit/>
+          </a:bodyPr>
+          <a:lstStyle/>
+          <a:p>
+            <a:r>
+              <a:rPr lang="en-US" sz="1000" b="1">
+                <a:solidFill>
+                  <a:schemeClr val="bg1"/>
+                </a:solidFill>
+                <a:latin typeface="Poppins" panose="00000500000000000000" pitchFamily="2" charset="0"/>
+                <a:cs typeface="Poppins" panose="00000500000000000000" pitchFamily="2" charset="0"/>
+              </a:rPr>
+              <a:t>4</a:t>
+            </a:r>
+            <a:endParaRPr lang="en-IN" sz="1000" b="1">
+              <a:solidFill>
+                <a:schemeClr val="bg1"/>
+              </a:solidFill>
+              <a:latin typeface="Poppins" panose="00000500000000000000" pitchFamily="2" charset="0"/>
+              <a:cs typeface="Poppins" panose="00000500000000000000" pitchFamily="2" charset="0"/>
+            </a:endParaRPr>
           </a:p>
         </p:txBody>
       </p:sp>
@@ -12546,6 +12846,54 @@
           </a:p>
         </p:txBody>
       </p:sp>
+      <p:sp>
+        <p:nvSpPr>
+          <p:cNvPr id="3" name="TextBox 2">
+            <a:extLst>
+              <a:ext uri="{FF2B5EF4-FFF2-40B4-BE49-F238E27FC236}">
+                <a16:creationId xmlns:a16="http://schemas.microsoft.com/office/drawing/2014/main" id="{929046E4-3C24-F352-8CB4-DC9DDD2A1D38}"/>
+              </a:ext>
+            </a:extLst>
+          </p:cNvPr>
+          <p:cNvSpPr txBox="1"/>
+          <p:nvPr/>
+        </p:nvSpPr>
+        <p:spPr>
+          <a:xfrm>
+            <a:off x="8724900" y="4845089"/>
+            <a:ext cx="327660" cy="246221"/>
+          </a:xfrm>
+          <a:prstGeom prst="rect">
+            <a:avLst/>
+          </a:prstGeom>
+          <a:noFill/>
+        </p:spPr>
+        <p:txBody>
+          <a:bodyPr wrap="square" rtlCol="0">
+            <a:spAutoFit/>
+          </a:bodyPr>
+          <a:lstStyle/>
+          <a:p>
+            <a:r>
+              <a:rPr lang="en-US" sz="1000" b="1">
+                <a:solidFill>
+                  <a:schemeClr val="bg1"/>
+                </a:solidFill>
+                <a:latin typeface="Poppins" panose="00000500000000000000" pitchFamily="2" charset="0"/>
+                <a:cs typeface="Poppins" panose="00000500000000000000" pitchFamily="2" charset="0"/>
+              </a:rPr>
+              <a:t>5</a:t>
+            </a:r>
+            <a:endParaRPr lang="en-IN" sz="1000" b="1">
+              <a:solidFill>
+                <a:schemeClr val="bg1"/>
+              </a:solidFill>
+              <a:latin typeface="Poppins" panose="00000500000000000000" pitchFamily="2" charset="0"/>
+              <a:cs typeface="Poppins" panose="00000500000000000000" pitchFamily="2" charset="0"/>
+            </a:endParaRPr>
+          </a:p>
+        </p:txBody>
+      </p:sp>
     </p:spTree>
     <p:extLst>
       <p:ext uri="{BB962C8B-B14F-4D97-AF65-F5344CB8AC3E}">
@@ -13170,6 +13518,54 @@
           </a:prstGeom>
         </p:spPr>
       </p:pic>
+      <p:sp>
+        <p:nvSpPr>
+          <p:cNvPr id="3" name="TextBox 2">
+            <a:extLst>
+              <a:ext uri="{FF2B5EF4-FFF2-40B4-BE49-F238E27FC236}">
+                <a16:creationId xmlns:a16="http://schemas.microsoft.com/office/drawing/2014/main" id="{F30F90FE-AFBC-6E04-534C-EF89BFB9BA93}"/>
+              </a:ext>
+            </a:extLst>
+          </p:cNvPr>
+          <p:cNvSpPr txBox="1"/>
+          <p:nvPr/>
+        </p:nvSpPr>
+        <p:spPr>
+          <a:xfrm>
+            <a:off x="8724900" y="4845089"/>
+            <a:ext cx="327660" cy="246221"/>
+          </a:xfrm>
+          <a:prstGeom prst="rect">
+            <a:avLst/>
+          </a:prstGeom>
+          <a:noFill/>
+        </p:spPr>
+        <p:txBody>
+          <a:bodyPr wrap="square" rtlCol="0">
+            <a:spAutoFit/>
+          </a:bodyPr>
+          <a:lstStyle/>
+          <a:p>
+            <a:r>
+              <a:rPr lang="en-US" sz="1000" b="1">
+                <a:solidFill>
+                  <a:schemeClr val="bg1"/>
+                </a:solidFill>
+                <a:latin typeface="Poppins" panose="00000500000000000000" pitchFamily="2" charset="0"/>
+                <a:cs typeface="Poppins" panose="00000500000000000000" pitchFamily="2" charset="0"/>
+              </a:rPr>
+              <a:t>6</a:t>
+            </a:r>
+            <a:endParaRPr lang="en-IN" sz="1000" b="1">
+              <a:solidFill>
+                <a:schemeClr val="bg1"/>
+              </a:solidFill>
+              <a:latin typeface="Poppins" panose="00000500000000000000" pitchFamily="2" charset="0"/>
+              <a:cs typeface="Poppins" panose="00000500000000000000" pitchFamily="2" charset="0"/>
+            </a:endParaRPr>
+          </a:p>
+        </p:txBody>
+      </p:sp>
     </p:spTree>
     <p:extLst>
       <p:ext uri="{BB962C8B-B14F-4D97-AF65-F5344CB8AC3E}">
@@ -13719,6 +14115,54 @@
           </a:ln>
         </p:spPr>
       </p:pic>
+      <p:sp>
+        <p:nvSpPr>
+          <p:cNvPr id="3" name="TextBox 2">
+            <a:extLst>
+              <a:ext uri="{FF2B5EF4-FFF2-40B4-BE49-F238E27FC236}">
+                <a16:creationId xmlns:a16="http://schemas.microsoft.com/office/drawing/2014/main" id="{113AD12C-EAB8-4D1C-2B4D-C861EEAC3827}"/>
+              </a:ext>
+            </a:extLst>
+          </p:cNvPr>
+          <p:cNvSpPr txBox="1"/>
+          <p:nvPr/>
+        </p:nvSpPr>
+        <p:spPr>
+          <a:xfrm>
+            <a:off x="8724900" y="4845089"/>
+            <a:ext cx="327660" cy="246221"/>
+          </a:xfrm>
+          <a:prstGeom prst="rect">
+            <a:avLst/>
+          </a:prstGeom>
+          <a:noFill/>
+        </p:spPr>
+        <p:txBody>
+          <a:bodyPr wrap="square" rtlCol="0">
+            <a:spAutoFit/>
+          </a:bodyPr>
+          <a:lstStyle/>
+          <a:p>
+            <a:r>
+              <a:rPr lang="en-US" sz="1000" b="1">
+                <a:solidFill>
+                  <a:schemeClr val="bg1"/>
+                </a:solidFill>
+                <a:latin typeface="Poppins" panose="00000500000000000000" pitchFamily="2" charset="0"/>
+                <a:cs typeface="Poppins" panose="00000500000000000000" pitchFamily="2" charset="0"/>
+              </a:rPr>
+              <a:t>7</a:t>
+            </a:r>
+            <a:endParaRPr lang="en-IN" sz="1000" b="1">
+              <a:solidFill>
+                <a:schemeClr val="bg1"/>
+              </a:solidFill>
+              <a:latin typeface="Poppins" panose="00000500000000000000" pitchFamily="2" charset="0"/>
+              <a:cs typeface="Poppins" panose="00000500000000000000" pitchFamily="2" charset="0"/>
+            </a:endParaRPr>
+          </a:p>
+        </p:txBody>
+      </p:sp>
     </p:spTree>
     <p:extLst>
       <p:ext uri="{BB962C8B-B14F-4D97-AF65-F5344CB8AC3E}">
@@ -14225,6 +14669,54 @@
           </a:ln>
         </p:spPr>
       </p:pic>
+      <p:sp>
+        <p:nvSpPr>
+          <p:cNvPr id="3" name="TextBox 2">
+            <a:extLst>
+              <a:ext uri="{FF2B5EF4-FFF2-40B4-BE49-F238E27FC236}">
+                <a16:creationId xmlns:a16="http://schemas.microsoft.com/office/drawing/2014/main" id="{9FD3C13F-AAAF-CE62-3426-06A7D988DB76}"/>
+              </a:ext>
+            </a:extLst>
+          </p:cNvPr>
+          <p:cNvSpPr txBox="1"/>
+          <p:nvPr/>
+        </p:nvSpPr>
+        <p:spPr>
+          <a:xfrm>
+            <a:off x="8724900" y="4845089"/>
+            <a:ext cx="327660" cy="246221"/>
+          </a:xfrm>
+          <a:prstGeom prst="rect">
+            <a:avLst/>
+          </a:prstGeom>
+          <a:noFill/>
+        </p:spPr>
+        <p:txBody>
+          <a:bodyPr wrap="square" rtlCol="0">
+            <a:spAutoFit/>
+          </a:bodyPr>
+          <a:lstStyle/>
+          <a:p>
+            <a:r>
+              <a:rPr lang="en-US" sz="1000" b="1">
+                <a:solidFill>
+                  <a:schemeClr val="bg1"/>
+                </a:solidFill>
+                <a:latin typeface="Poppins" panose="00000500000000000000" pitchFamily="2" charset="0"/>
+                <a:cs typeface="Poppins" panose="00000500000000000000" pitchFamily="2" charset="0"/>
+              </a:rPr>
+              <a:t>8</a:t>
+            </a:r>
+            <a:endParaRPr lang="en-IN" sz="1000" b="1">
+              <a:solidFill>
+                <a:schemeClr val="bg1"/>
+              </a:solidFill>
+              <a:latin typeface="Poppins" panose="00000500000000000000" pitchFamily="2" charset="0"/>
+              <a:cs typeface="Poppins" panose="00000500000000000000" pitchFamily="2" charset="0"/>
+            </a:endParaRPr>
+          </a:p>
+        </p:txBody>
+      </p:sp>
     </p:spTree>
     <p:extLst>
       <p:ext uri="{BB962C8B-B14F-4D97-AF65-F5344CB8AC3E}">

</xml_diff>